<commit_message>
Extended AvalonEdit.Sample + article. Fixed FxCop issues in AvalonEdit.
git-svn-id: svn://svn.sharpdevelop.net/sharpdevelop/trunk@5040 1ccf3a8d-04fe-1044-b7c0-cef0b8235c61
</commit_message>
<xml_diff>
--- a/samples/AvalonEdit.Sample/RenderingPipeline.pptx
+++ b/samples/AvalonEdit.Sample/RenderingPipeline.pptx
@@ -288,7 +288,8 @@
           <a:p>
             <a:fld id="{8AA2C9E8-DAC2-4126-BA81-E7341F6EFE02}" type="datetimeFigureOut">
               <a:rPr lang="de-DE" smtClean="0"/>
-              <a:t>19.09.2009</a:t>
+              <a:pPr/>
+              <a:t>02.10.2009</a:t>
             </a:fld>
             <a:endParaRPr lang="de-DE"/>
           </a:p>
@@ -330,6 +331,7 @@
           <a:p>
             <a:fld id="{061C9186-4735-47A8-A6A9-25DC0D4467E2}" type="slidenum">
               <a:rPr lang="de-DE" smtClean="0"/>
+              <a:pPr/>
               <a:t>‹#›</a:t>
             </a:fld>
             <a:endParaRPr lang="de-DE"/>
@@ -453,7 +455,8 @@
           <a:p>
             <a:fld id="{8AA2C9E8-DAC2-4126-BA81-E7341F6EFE02}" type="datetimeFigureOut">
               <a:rPr lang="de-DE" smtClean="0"/>
-              <a:t>19.09.2009</a:t>
+              <a:pPr/>
+              <a:t>02.10.2009</a:t>
             </a:fld>
             <a:endParaRPr lang="de-DE"/>
           </a:p>
@@ -495,6 +498,7 @@
           <a:p>
             <a:fld id="{061C9186-4735-47A8-A6A9-25DC0D4467E2}" type="slidenum">
               <a:rPr lang="de-DE" smtClean="0"/>
+              <a:pPr/>
               <a:t>‹#›</a:t>
             </a:fld>
             <a:endParaRPr lang="de-DE"/>
@@ -628,7 +632,8 @@
           <a:p>
             <a:fld id="{8AA2C9E8-DAC2-4126-BA81-E7341F6EFE02}" type="datetimeFigureOut">
               <a:rPr lang="de-DE" smtClean="0"/>
-              <a:t>19.09.2009</a:t>
+              <a:pPr/>
+              <a:t>02.10.2009</a:t>
             </a:fld>
             <a:endParaRPr lang="de-DE"/>
           </a:p>
@@ -670,6 +675,7 @@
           <a:p>
             <a:fld id="{061C9186-4735-47A8-A6A9-25DC0D4467E2}" type="slidenum">
               <a:rPr lang="de-DE" smtClean="0"/>
+              <a:pPr/>
               <a:t>‹#›</a:t>
             </a:fld>
             <a:endParaRPr lang="de-DE"/>
@@ -793,7 +799,8 @@
           <a:p>
             <a:fld id="{8AA2C9E8-DAC2-4126-BA81-E7341F6EFE02}" type="datetimeFigureOut">
               <a:rPr lang="de-DE" smtClean="0"/>
-              <a:t>19.09.2009</a:t>
+              <a:pPr/>
+              <a:t>02.10.2009</a:t>
             </a:fld>
             <a:endParaRPr lang="de-DE"/>
           </a:p>
@@ -835,6 +842,7 @@
           <a:p>
             <a:fld id="{061C9186-4735-47A8-A6A9-25DC0D4467E2}" type="slidenum">
               <a:rPr lang="de-DE" smtClean="0"/>
+              <a:pPr/>
               <a:t>‹#›</a:t>
             </a:fld>
             <a:endParaRPr lang="de-DE"/>
@@ -1034,7 +1042,8 @@
           <a:p>
             <a:fld id="{8AA2C9E8-DAC2-4126-BA81-E7341F6EFE02}" type="datetimeFigureOut">
               <a:rPr lang="de-DE" smtClean="0"/>
-              <a:t>19.09.2009</a:t>
+              <a:pPr/>
+              <a:t>02.10.2009</a:t>
             </a:fld>
             <a:endParaRPr lang="de-DE"/>
           </a:p>
@@ -1076,6 +1085,7 @@
           <a:p>
             <a:fld id="{061C9186-4735-47A8-A6A9-25DC0D4467E2}" type="slidenum">
               <a:rPr lang="de-DE" smtClean="0"/>
+              <a:pPr/>
               <a:t>‹#›</a:t>
             </a:fld>
             <a:endParaRPr lang="de-DE"/>
@@ -1317,7 +1327,8 @@
           <a:p>
             <a:fld id="{8AA2C9E8-DAC2-4126-BA81-E7341F6EFE02}" type="datetimeFigureOut">
               <a:rPr lang="de-DE" smtClean="0"/>
-              <a:t>19.09.2009</a:t>
+              <a:pPr/>
+              <a:t>02.10.2009</a:t>
             </a:fld>
             <a:endParaRPr lang="de-DE"/>
           </a:p>
@@ -1359,6 +1370,7 @@
           <a:p>
             <a:fld id="{061C9186-4735-47A8-A6A9-25DC0D4467E2}" type="slidenum">
               <a:rPr lang="de-DE" smtClean="0"/>
+              <a:pPr/>
               <a:t>‹#›</a:t>
             </a:fld>
             <a:endParaRPr lang="de-DE"/>
@@ -1734,7 +1746,8 @@
           <a:p>
             <a:fld id="{8AA2C9E8-DAC2-4126-BA81-E7341F6EFE02}" type="datetimeFigureOut">
               <a:rPr lang="de-DE" smtClean="0"/>
-              <a:t>19.09.2009</a:t>
+              <a:pPr/>
+              <a:t>02.10.2009</a:t>
             </a:fld>
             <a:endParaRPr lang="de-DE"/>
           </a:p>
@@ -1776,6 +1789,7 @@
           <a:p>
             <a:fld id="{061C9186-4735-47A8-A6A9-25DC0D4467E2}" type="slidenum">
               <a:rPr lang="de-DE" smtClean="0"/>
+              <a:pPr/>
               <a:t>‹#›</a:t>
             </a:fld>
             <a:endParaRPr lang="de-DE"/>
@@ -1847,7 +1861,8 @@
           <a:p>
             <a:fld id="{8AA2C9E8-DAC2-4126-BA81-E7341F6EFE02}" type="datetimeFigureOut">
               <a:rPr lang="de-DE" smtClean="0"/>
-              <a:t>19.09.2009</a:t>
+              <a:pPr/>
+              <a:t>02.10.2009</a:t>
             </a:fld>
             <a:endParaRPr lang="de-DE"/>
           </a:p>
@@ -1889,6 +1904,7 @@
           <a:p>
             <a:fld id="{061C9186-4735-47A8-A6A9-25DC0D4467E2}" type="slidenum">
               <a:rPr lang="de-DE" smtClean="0"/>
+              <a:pPr/>
               <a:t>‹#›</a:t>
             </a:fld>
             <a:endParaRPr lang="de-DE"/>
@@ -1937,7 +1953,8 @@
           <a:p>
             <a:fld id="{8AA2C9E8-DAC2-4126-BA81-E7341F6EFE02}" type="datetimeFigureOut">
               <a:rPr lang="de-DE" smtClean="0"/>
-              <a:t>19.09.2009</a:t>
+              <a:pPr/>
+              <a:t>02.10.2009</a:t>
             </a:fld>
             <a:endParaRPr lang="de-DE"/>
           </a:p>
@@ -1979,6 +1996,7 @@
           <a:p>
             <a:fld id="{061C9186-4735-47A8-A6A9-25DC0D4467E2}" type="slidenum">
               <a:rPr lang="de-DE" smtClean="0"/>
+              <a:pPr/>
               <a:t>‹#›</a:t>
             </a:fld>
             <a:endParaRPr lang="de-DE"/>
@@ -2209,7 +2227,8 @@
           <a:p>
             <a:fld id="{8AA2C9E8-DAC2-4126-BA81-E7341F6EFE02}" type="datetimeFigureOut">
               <a:rPr lang="de-DE" smtClean="0"/>
-              <a:t>19.09.2009</a:t>
+              <a:pPr/>
+              <a:t>02.10.2009</a:t>
             </a:fld>
             <a:endParaRPr lang="de-DE"/>
           </a:p>
@@ -2251,6 +2270,7 @@
           <a:p>
             <a:fld id="{061C9186-4735-47A8-A6A9-25DC0D4467E2}" type="slidenum">
               <a:rPr lang="de-DE" smtClean="0"/>
+              <a:pPr/>
               <a:t>‹#›</a:t>
             </a:fld>
             <a:endParaRPr lang="de-DE"/>
@@ -2457,7 +2477,8 @@
           <a:p>
             <a:fld id="{8AA2C9E8-DAC2-4126-BA81-E7341F6EFE02}" type="datetimeFigureOut">
               <a:rPr lang="de-DE" smtClean="0"/>
-              <a:t>19.09.2009</a:t>
+              <a:pPr/>
+              <a:t>02.10.2009</a:t>
             </a:fld>
             <a:endParaRPr lang="de-DE"/>
           </a:p>
@@ -2499,6 +2520,7 @@
           <a:p>
             <a:fld id="{061C9186-4735-47A8-A6A9-25DC0D4467E2}" type="slidenum">
               <a:rPr lang="de-DE" smtClean="0"/>
+              <a:pPr/>
               <a:t>‹#›</a:t>
             </a:fld>
             <a:endParaRPr lang="de-DE"/>
@@ -2665,7 +2687,8 @@
           <a:p>
             <a:fld id="{8AA2C9E8-DAC2-4126-BA81-E7341F6EFE02}" type="datetimeFigureOut">
               <a:rPr lang="de-DE" smtClean="0"/>
-              <a:t>19.09.2009</a:t>
+              <a:pPr/>
+              <a:t>02.10.2009</a:t>
             </a:fld>
             <a:endParaRPr lang="de-DE"/>
           </a:p>
@@ -2743,6 +2766,7 @@
           <a:p>
             <a:fld id="{061C9186-4735-47A8-A6A9-25DC0D4467E2}" type="slidenum">
               <a:rPr lang="de-DE" smtClean="0"/>
+              <a:pPr/>
               <a:t>‹#›</a:t>
             </a:fld>
             <a:endParaRPr lang="de-DE"/>
@@ -3128,11 +3152,7 @@
           <a:p>
             <a:r>
               <a:rPr lang="en-US" sz="800" dirty="0" err="1" smtClean="0"/>
-              <a:t>VisualLine</a:t>
-            </a:r>
-            <a:r>
-              <a:rPr lang="en-US" sz="800" dirty="0" err="1" smtClean="0"/>
-              <a:t>LinkText</a:t>
+              <a:t>VisualLineLinkText</a:t>
             </a:r>
             <a:endParaRPr lang="en-US" sz="800" dirty="0" smtClean="0"/>
           </a:p>
@@ -3739,7 +3759,7 @@
         <p:spPr>
           <a:xfrm>
             <a:off x="2928926" y="2714620"/>
-            <a:ext cx="1214446" cy="215444"/>
+            <a:ext cx="1214446" cy="338554"/>
           </a:xfrm>
           <a:prstGeom prst="rect">
             <a:avLst/>
@@ -3758,7 +3778,15 @@
             </a:r>
             <a:r>
               <a:rPr lang="en-US" sz="800" dirty="0" smtClean="0"/>
-              <a:t> was split</a:t>
+              <a:t> was </a:t>
+            </a:r>
+            <a:r>
+              <a:rPr lang="en-US" sz="800" dirty="0" smtClean="0"/>
+              <a:t>split by </a:t>
+            </a:r>
+            <a:r>
+              <a:rPr lang="en-US" sz="800" dirty="0" smtClean="0"/>
+              <a:t>syntax highlighting</a:t>
             </a:r>
             <a:endParaRPr lang="de-DE" sz="800" dirty="0"/>
           </a:p>
@@ -4057,8 +4085,8 @@
         </p:nvSpPr>
         <p:spPr>
           <a:xfrm>
-            <a:off x="1785918" y="4857760"/>
-            <a:ext cx="1000132" cy="307777"/>
+            <a:off x="1857356" y="5143512"/>
+            <a:ext cx="928694" cy="307777"/>
           </a:xfrm>
           <a:prstGeom prst="rect">
             <a:avLst/>
@@ -4104,12 +4132,12 @@
         </p:nvCxnSpPr>
         <p:spPr>
           <a:xfrm rot="16200000" flipH="1">
-            <a:off x="1815637" y="4387413"/>
-            <a:ext cx="369190" cy="571504"/>
+            <a:off x="1690620" y="4512429"/>
+            <a:ext cx="654942" cy="607223"/>
           </a:xfrm>
           <a:prstGeom prst="bentConnector3">
             <a:avLst>
-              <a:gd name="adj1" fmla="val 50000"/>
+              <a:gd name="adj1" fmla="val 76760"/>
             </a:avLst>
           </a:prstGeom>
           <a:ln>
@@ -4142,12 +4170,12 @@
         </p:nvCxnSpPr>
         <p:spPr>
           <a:xfrm rot="5400000">
-            <a:off x="2422860" y="4351694"/>
-            <a:ext cx="369190" cy="642942"/>
+            <a:off x="2297844" y="4512430"/>
+            <a:ext cx="654942" cy="607223"/>
           </a:xfrm>
           <a:prstGeom prst="bentConnector3">
             <a:avLst>
-              <a:gd name="adj1" fmla="val 50000"/>
+              <a:gd name="adj1" fmla="val 76760"/>
             </a:avLst>
           </a:prstGeom>
           <a:ln>
@@ -4169,6 +4197,162 @@
           </a:fontRef>
         </p:style>
       </p:cxnSp>
+      <p:sp>
+        <p:nvSpPr>
+          <p:cNvPr id="27" name="TextBox 26"/>
+          <p:cNvSpPr txBox="1"/>
+          <p:nvPr/>
+        </p:nvSpPr>
+        <p:spPr>
+          <a:xfrm>
+            <a:off x="1928794" y="4572008"/>
+            <a:ext cx="785818" cy="369332"/>
+          </a:xfrm>
+          <a:prstGeom prst="rect">
+            <a:avLst/>
+          </a:prstGeom>
+          <a:noFill/>
+        </p:spPr>
+        <p:txBody>
+          <a:bodyPr wrap="square" rtlCol="0">
+            <a:spAutoFit/>
+          </a:bodyPr>
+          <a:lstStyle/>
+          <a:p>
+            <a:pPr algn="ctr"/>
+            <a:r>
+              <a:rPr lang="en-US" sz="900" dirty="0" smtClean="0"/>
+              <a:t>Background</a:t>
+            </a:r>
+          </a:p>
+          <a:p>
+            <a:pPr algn="ctr"/>
+            <a:r>
+              <a:rPr lang="en-US" sz="900" dirty="0" smtClean="0"/>
+              <a:t>Renderers</a:t>
+            </a:r>
+            <a:endParaRPr lang="de-DE" sz="900" dirty="0"/>
+          </a:p>
+        </p:txBody>
+      </p:sp>
+      <p:cxnSp>
+        <p:nvCxnSpPr>
+          <p:cNvPr id="33" name="Elbow Connector 32"/>
+          <p:cNvCxnSpPr>
+            <a:stCxn id="72" idx="2"/>
+            <a:endCxn id="149" idx="0"/>
+          </p:cNvCxnSpPr>
+          <p:nvPr/>
+        </p:nvCxnSpPr>
+        <p:spPr>
+          <a:xfrm rot="5400000">
+            <a:off x="1438682" y="4260490"/>
+            <a:ext cx="1766043" cy="1588"/>
+          </a:xfrm>
+          <a:prstGeom prst="bentConnector3">
+            <a:avLst>
+              <a:gd name="adj1" fmla="val 50000"/>
+            </a:avLst>
+          </a:prstGeom>
+          <a:ln>
+            <a:prstDash val="dash"/>
+            <a:tailEnd type="arrow"/>
+          </a:ln>
+        </p:spPr>
+        <p:style>
+          <a:lnRef idx="1">
+            <a:schemeClr val="accent1"/>
+          </a:lnRef>
+          <a:fillRef idx="0">
+            <a:schemeClr val="accent1"/>
+          </a:fillRef>
+          <a:effectRef idx="0">
+            <a:schemeClr val="accent1"/>
+          </a:effectRef>
+          <a:fontRef idx="minor">
+            <a:schemeClr val="tx1"/>
+          </a:fontRef>
+        </p:style>
+      </p:cxnSp>
+      <p:cxnSp>
+        <p:nvCxnSpPr>
+          <p:cNvPr id="70" name="Elbow Connector 69"/>
+          <p:cNvCxnSpPr>
+            <a:stCxn id="71" idx="1"/>
+          </p:cNvCxnSpPr>
+          <p:nvPr/>
+        </p:nvCxnSpPr>
+        <p:spPr>
+          <a:xfrm rot="10800000">
+            <a:off x="2643174" y="4786322"/>
+            <a:ext cx="785818" cy="1588"/>
+          </a:xfrm>
+          <a:prstGeom prst="bentConnector3">
+            <a:avLst>
+              <a:gd name="adj1" fmla="val 50000"/>
+            </a:avLst>
+          </a:prstGeom>
+          <a:ln>
+            <a:tailEnd type="arrow"/>
+          </a:ln>
+        </p:spPr>
+        <p:style>
+          <a:lnRef idx="1">
+            <a:schemeClr val="accent2"/>
+          </a:lnRef>
+          <a:fillRef idx="0">
+            <a:schemeClr val="accent2"/>
+          </a:fillRef>
+          <a:effectRef idx="0">
+            <a:schemeClr val="accent2"/>
+          </a:effectRef>
+          <a:fontRef idx="minor">
+            <a:schemeClr val="tx1"/>
+          </a:fontRef>
+        </p:style>
+      </p:cxnSp>
+      <p:sp>
+        <p:nvSpPr>
+          <p:cNvPr id="71" name="Rectangle 70"/>
+          <p:cNvSpPr/>
+          <p:nvPr/>
+        </p:nvSpPr>
+        <p:spPr>
+          <a:xfrm>
+            <a:off x="3428992" y="4572008"/>
+            <a:ext cx="785818" cy="428628"/>
+          </a:xfrm>
+          <a:prstGeom prst="rect">
+            <a:avLst/>
+          </a:prstGeom>
+        </p:spPr>
+        <p:style>
+          <a:lnRef idx="1">
+            <a:schemeClr val="accent2"/>
+          </a:lnRef>
+          <a:fillRef idx="2">
+            <a:schemeClr val="accent2"/>
+          </a:fillRef>
+          <a:effectRef idx="1">
+            <a:schemeClr val="accent2"/>
+          </a:effectRef>
+          <a:fontRef idx="minor">
+            <a:schemeClr val="dk1"/>
+          </a:fontRef>
+        </p:style>
+        <p:txBody>
+          <a:bodyPr rtlCol="0" anchor="ctr"/>
+          <a:lstStyle/>
+          <a:p>
+            <a:pPr algn="ctr"/>
+            <a:r>
+              <a:rPr lang="en-US" sz="900" dirty="0" smtClean="0"/>
+              <a:t>Current Selection</a:t>
+            </a:r>
+            <a:endParaRPr lang="de-DE" sz="900" dirty="0"/>
+          </a:p>
+        </p:txBody>
+      </p:sp>
     </p:spTree>
   </p:cSld>
   <p:clrMapOvr>

</xml_diff>